<commit_message>
updated graphs for report 2
</commit_message>
<xml_diff>
--- a/Project Status Report 2/complexsystemsreport2.pptx
+++ b/Project Status Report 2/complexsystemsreport2.pptx
@@ -201,7 +201,7 @@
           <a:p>
             <a:fld id="{716ECBBD-C828-4D65-BAA1-D5361C751F0C}" type="datetimeFigureOut">
               <a:rPr lang="en-US" smtClean="0"/>
-              <a:t>4/9/2024</a:t>
+              <a:t>4/10/2024</a:t>
             </a:fld>
             <a:endParaRPr lang="en-US"/>
           </a:p>
@@ -1061,7 +1061,7 @@
           <a:p>
             <a:fld id="{3CC2385E-BAC7-3F42-B91F-3AC00928A3BA}" type="datetimeFigureOut">
               <a:rPr lang="en-US" smtClean="0"/>
-              <a:t>4/9/2024</a:t>
+              <a:t>4/10/2024</a:t>
             </a:fld>
             <a:endParaRPr lang="en-US"/>
           </a:p>
@@ -1259,7 +1259,7 @@
           <a:p>
             <a:fld id="{3CC2385E-BAC7-3F42-B91F-3AC00928A3BA}" type="datetimeFigureOut">
               <a:rPr lang="en-US" smtClean="0"/>
-              <a:t>4/9/2024</a:t>
+              <a:t>4/10/2024</a:t>
             </a:fld>
             <a:endParaRPr lang="en-US"/>
           </a:p>
@@ -1467,7 +1467,7 @@
           <a:p>
             <a:fld id="{3CC2385E-BAC7-3F42-B91F-3AC00928A3BA}" type="datetimeFigureOut">
               <a:rPr lang="en-US" smtClean="0"/>
-              <a:t>4/9/2024</a:t>
+              <a:t>4/10/2024</a:t>
             </a:fld>
             <a:endParaRPr lang="en-US"/>
           </a:p>
@@ -1665,7 +1665,7 @@
           <a:p>
             <a:fld id="{3CC2385E-BAC7-3F42-B91F-3AC00928A3BA}" type="datetimeFigureOut">
               <a:rPr lang="en-US" smtClean="0"/>
-              <a:t>4/9/2024</a:t>
+              <a:t>4/10/2024</a:t>
             </a:fld>
             <a:endParaRPr lang="en-US"/>
           </a:p>
@@ -1940,7 +1940,7 @@
           <a:p>
             <a:fld id="{3CC2385E-BAC7-3F42-B91F-3AC00928A3BA}" type="datetimeFigureOut">
               <a:rPr lang="en-US" smtClean="0"/>
-              <a:t>4/9/2024</a:t>
+              <a:t>4/10/2024</a:t>
             </a:fld>
             <a:endParaRPr lang="en-US"/>
           </a:p>
@@ -2205,7 +2205,7 @@
           <a:p>
             <a:fld id="{3CC2385E-BAC7-3F42-B91F-3AC00928A3BA}" type="datetimeFigureOut">
               <a:rPr lang="en-US" smtClean="0"/>
-              <a:t>4/9/2024</a:t>
+              <a:t>4/10/2024</a:t>
             </a:fld>
             <a:endParaRPr lang="en-US"/>
           </a:p>
@@ -2617,7 +2617,7 @@
           <a:p>
             <a:fld id="{3CC2385E-BAC7-3F42-B91F-3AC00928A3BA}" type="datetimeFigureOut">
               <a:rPr lang="en-US" smtClean="0"/>
-              <a:t>4/9/2024</a:t>
+              <a:t>4/10/2024</a:t>
             </a:fld>
             <a:endParaRPr lang="en-US"/>
           </a:p>
@@ -2758,7 +2758,7 @@
           <a:p>
             <a:fld id="{3CC2385E-BAC7-3F42-B91F-3AC00928A3BA}" type="datetimeFigureOut">
               <a:rPr lang="en-US" smtClean="0"/>
-              <a:t>4/9/2024</a:t>
+              <a:t>4/10/2024</a:t>
             </a:fld>
             <a:endParaRPr lang="en-US"/>
           </a:p>
@@ -2871,7 +2871,7 @@
           <a:p>
             <a:fld id="{3CC2385E-BAC7-3F42-B91F-3AC00928A3BA}" type="datetimeFigureOut">
               <a:rPr lang="en-US" smtClean="0"/>
-              <a:t>4/9/2024</a:t>
+              <a:t>4/10/2024</a:t>
             </a:fld>
             <a:endParaRPr lang="en-US"/>
           </a:p>
@@ -3182,7 +3182,7 @@
           <a:p>
             <a:fld id="{3CC2385E-BAC7-3F42-B91F-3AC00928A3BA}" type="datetimeFigureOut">
               <a:rPr lang="en-US" smtClean="0"/>
-              <a:t>4/9/2024</a:t>
+              <a:t>4/10/2024</a:t>
             </a:fld>
             <a:endParaRPr lang="en-US"/>
           </a:p>
@@ -3470,7 +3470,7 @@
           <a:p>
             <a:fld id="{3CC2385E-BAC7-3F42-B91F-3AC00928A3BA}" type="datetimeFigureOut">
               <a:rPr lang="en-US" smtClean="0"/>
-              <a:t>4/9/2024</a:t>
+              <a:t>4/10/2024</a:t>
             </a:fld>
             <a:endParaRPr lang="en-US"/>
           </a:p>
@@ -3711,7 +3711,7 @@
           <a:p>
             <a:fld id="{3CC2385E-BAC7-3F42-B91F-3AC00928A3BA}" type="datetimeFigureOut">
               <a:rPr lang="en-US" smtClean="0"/>
-              <a:t>4/9/2024</a:t>
+              <a:t>4/10/2024</a:t>
             </a:fld>
             <a:endParaRPr lang="en-US"/>
           </a:p>
@@ -4476,10 +4476,10 @@
       </p:sp>
       <p:pic>
         <p:nvPicPr>
-          <p:cNvPr id="5" name="Picture 4">
-            <a:extLst>
-              <a:ext uri="{FF2B5EF4-FFF2-40B4-BE49-F238E27FC236}">
-                <a16:creationId xmlns:a16="http://schemas.microsoft.com/office/drawing/2014/main" id="{45FED379-AF42-579F-56DA-9D15CD4EC6D8}"/>
+          <p:cNvPr id="11" name="Picture 10">
+            <a:extLst>
+              <a:ext uri="{FF2B5EF4-FFF2-40B4-BE49-F238E27FC236}">
+                <a16:creationId xmlns:a16="http://schemas.microsoft.com/office/drawing/2014/main" id="{20E77F62-0F68-D8CF-94CF-B9EB8C9F7A9A}"/>
               </a:ext>
             </a:extLst>
           </p:cNvPr>
@@ -4496,8 +4496,8 @@
         </p:blipFill>
         <p:spPr>
           <a:xfrm>
-            <a:off x="6751477" y="290182"/>
-            <a:ext cx="5231363" cy="3138818"/>
+            <a:off x="554782" y="167951"/>
+            <a:ext cx="5435082" cy="3261049"/>
           </a:xfrm>
           <a:prstGeom prst="rect">
             <a:avLst/>
@@ -4506,10 +4506,10 @@
       </p:pic>
       <p:pic>
         <p:nvPicPr>
-          <p:cNvPr id="10" name="Picture 9">
-            <a:extLst>
-              <a:ext uri="{FF2B5EF4-FFF2-40B4-BE49-F238E27FC236}">
-                <a16:creationId xmlns:a16="http://schemas.microsoft.com/office/drawing/2014/main" id="{1E577B6D-24C7-2E71-62E6-187A10847D4F}"/>
+          <p:cNvPr id="3" name="Picture 2">
+            <a:extLst>
+              <a:ext uri="{FF2B5EF4-FFF2-40B4-BE49-F238E27FC236}">
+                <a16:creationId xmlns:a16="http://schemas.microsoft.com/office/drawing/2014/main" id="{AFF40668-A575-CB5B-BA33-9482E3D9C86C}"/>
               </a:ext>
             </a:extLst>
           </p:cNvPr>
@@ -4526,8 +4526,8 @@
         </p:blipFill>
         <p:spPr>
           <a:xfrm>
-            <a:off x="6751477" y="3457895"/>
-            <a:ext cx="5231363" cy="3138818"/>
+            <a:off x="6695882" y="3584355"/>
+            <a:ext cx="4972438" cy="2983463"/>
           </a:xfrm>
           <a:prstGeom prst="rect">
             <a:avLst/>
@@ -4536,10 +4536,10 @@
       </p:pic>
       <p:pic>
         <p:nvPicPr>
-          <p:cNvPr id="11" name="Picture 10">
-            <a:extLst>
-              <a:ext uri="{FF2B5EF4-FFF2-40B4-BE49-F238E27FC236}">
-                <a16:creationId xmlns:a16="http://schemas.microsoft.com/office/drawing/2014/main" id="{20E77F62-0F68-D8CF-94CF-B9EB8C9F7A9A}"/>
+          <p:cNvPr id="6" name="Picture 5">
+            <a:extLst>
+              <a:ext uri="{FF2B5EF4-FFF2-40B4-BE49-F238E27FC236}">
+                <a16:creationId xmlns:a16="http://schemas.microsoft.com/office/drawing/2014/main" id="{4CAAFB55-2FC3-93B9-40B3-3494179D08F3}"/>
               </a:ext>
             </a:extLst>
           </p:cNvPr>
@@ -4556,8 +4556,38 @@
         </p:blipFill>
         <p:spPr>
           <a:xfrm>
-            <a:off x="478195" y="1859591"/>
-            <a:ext cx="5435082" cy="3261049"/>
+            <a:off x="6695882" y="712976"/>
+            <a:ext cx="4972438" cy="2983463"/>
+          </a:xfrm>
+          <a:prstGeom prst="rect">
+            <a:avLst/>
+          </a:prstGeom>
+        </p:spPr>
+      </p:pic>
+      <p:pic>
+        <p:nvPicPr>
+          <p:cNvPr id="13" name="Picture 12">
+            <a:extLst>
+              <a:ext uri="{FF2B5EF4-FFF2-40B4-BE49-F238E27FC236}">
+                <a16:creationId xmlns:a16="http://schemas.microsoft.com/office/drawing/2014/main" id="{04F0C4E2-D191-60CF-B35D-83C3B0984FB7}"/>
+              </a:ext>
+            </a:extLst>
+          </p:cNvPr>
+          <p:cNvPicPr>
+            <a:picLocks noChangeAspect="1"/>
+          </p:cNvPicPr>
+          <p:nvPr/>
+        </p:nvPicPr>
+        <p:blipFill>
+          <a:blip r:embed="rId7"/>
+          <a:stretch>
+            <a:fillRect/>
+          </a:stretch>
+        </p:blipFill>
+        <p:spPr>
+          <a:xfrm>
+            <a:off x="554782" y="3264315"/>
+            <a:ext cx="5505839" cy="3303503"/>
           </a:xfrm>
           <a:prstGeom prst="rect">
             <a:avLst/>
@@ -4676,10 +4706,10 @@
       </p:sp>
       <p:pic>
         <p:nvPicPr>
-          <p:cNvPr id="3" name="Picture 2">
-            <a:extLst>
-              <a:ext uri="{FF2B5EF4-FFF2-40B4-BE49-F238E27FC236}">
-                <a16:creationId xmlns:a16="http://schemas.microsoft.com/office/drawing/2014/main" id="{376F4F3B-5828-CAA4-5086-CD19993A103C}"/>
+          <p:cNvPr id="6" name="Picture 5">
+            <a:extLst>
+              <a:ext uri="{FF2B5EF4-FFF2-40B4-BE49-F238E27FC236}">
+                <a16:creationId xmlns:a16="http://schemas.microsoft.com/office/drawing/2014/main" id="{6BCA9D6B-55A1-1933-26A3-893742CFCC25}"/>
               </a:ext>
             </a:extLst>
           </p:cNvPr>
@@ -4696,8 +4726,8 @@
         </p:blipFill>
         <p:spPr>
           <a:xfrm>
-            <a:off x="5889172" y="2055813"/>
-            <a:ext cx="5435082" cy="3261049"/>
+            <a:off x="262035" y="1861046"/>
+            <a:ext cx="5627137" cy="3376282"/>
           </a:xfrm>
           <a:prstGeom prst="rect">
             <a:avLst/>
@@ -4706,10 +4736,10 @@
       </p:pic>
       <p:pic>
         <p:nvPicPr>
-          <p:cNvPr id="6" name="Picture 5">
-            <a:extLst>
-              <a:ext uri="{FF2B5EF4-FFF2-40B4-BE49-F238E27FC236}">
-                <a16:creationId xmlns:a16="http://schemas.microsoft.com/office/drawing/2014/main" id="{6BCA9D6B-55A1-1933-26A3-893742CFCC25}"/>
+          <p:cNvPr id="4" name="Picture 3">
+            <a:extLst>
+              <a:ext uri="{FF2B5EF4-FFF2-40B4-BE49-F238E27FC236}">
+                <a16:creationId xmlns:a16="http://schemas.microsoft.com/office/drawing/2014/main" id="{0FFA1C47-F3E4-BA30-C472-05BD56FDAD33}"/>
               </a:ext>
             </a:extLst>
           </p:cNvPr>
@@ -4726,8 +4756,8 @@
         </p:blipFill>
         <p:spPr>
           <a:xfrm>
-            <a:off x="262035" y="1861046"/>
-            <a:ext cx="5627137" cy="3376282"/>
+            <a:off x="5730940" y="1969048"/>
+            <a:ext cx="5447134" cy="3268280"/>
           </a:xfrm>
           <a:prstGeom prst="rect">
             <a:avLst/>

</xml_diff>